<commit_message>
add file tree image
</commit_message>
<xml_diff>
--- a/tmp.pptx
+++ b/tmp.pptx
@@ -5691,7 +5691,7 @@
         <p:spPr>
           <a:xfrm>
             <a:off x="3172460" y="902970"/>
-            <a:ext cx="317500" cy="213995"/>
+            <a:ext cx="346075" cy="213995"/>
           </a:xfrm>
           <a:prstGeom prst="rect">
             <a:avLst/>
@@ -5708,7 +5708,7 @@
                 <a:latin typeface="Times New Roman" panose="02020603050405020304" charset="0"/>
                 <a:cs typeface="Times New Roman" panose="02020603050405020304" charset="0"/>
               </a:rPr>
-              <a:t>file</a:t>
+              <a:t>File</a:t>
             </a:r>
             <a:endParaRPr lang="en-US" sz="800" b="1">
               <a:latin typeface="Times New Roman" panose="02020603050405020304" charset="0"/>

</xml_diff>